<commit_message>
Removed redundant pages in presentation
</commit_message>
<xml_diff>
--- a/MaximumProfitPrediction.pptx
+++ b/MaximumProfitPrediction.pptx
@@ -7,8 +7,6 @@
   </p:sldMasterIdLst>
   <p:sldIdLst>
     <p:sldId id="256" r:id="rId4"/>
-    <p:sldId id="257" r:id="rId5"/>
-    <p:sldId id="258" r:id="rId6"/>
   </p:sldIdLst>
   <p:sldSz cx="9144000" cy="5145087"/>
   <p:notesSz cx="7772400" cy="10058400"/>
@@ -67,7 +65,7 @@
         <p:spPr>
           <a:xfrm>
             <a:off x="98280" y="4680"/>
-            <a:ext cx="8825400" cy="625320"/>
+            <a:ext cx="8825040" cy="625320"/>
           </a:xfrm>
           <a:prstGeom prst="rect">
             <a:avLst/>
@@ -103,8 +101,8 @@
         </p:nvSpPr>
         <p:spPr>
           <a:xfrm>
-            <a:off x="457200" y="1203480"/>
-            <a:ext cx="8229240" cy="1422720"/>
+            <a:off x="457200" y="1203840"/>
+            <a:ext cx="8229240" cy="1423080"/>
           </a:xfrm>
           <a:prstGeom prst="rect">
             <a:avLst/>
@@ -139,8 +137,8 @@
         </p:nvSpPr>
         <p:spPr>
           <a:xfrm>
-            <a:off x="457200" y="2761920"/>
-            <a:ext cx="8229240" cy="1422720"/>
+            <a:off x="457200" y="2762640"/>
+            <a:ext cx="8229240" cy="1423080"/>
           </a:xfrm>
           <a:prstGeom prst="rect">
             <a:avLst/>
@@ -198,7 +196,7 @@
         <p:spPr>
           <a:xfrm>
             <a:off x="98280" y="4680"/>
-            <a:ext cx="8825400" cy="625320"/>
+            <a:ext cx="8825040" cy="625320"/>
           </a:xfrm>
           <a:prstGeom prst="rect">
             <a:avLst/>
@@ -234,8 +232,8 @@
         </p:nvSpPr>
         <p:spPr>
           <a:xfrm>
-            <a:off x="457200" y="1203480"/>
-            <a:ext cx="4015800" cy="1422720"/>
+            <a:off x="457200" y="1203840"/>
+            <a:ext cx="4015800" cy="1423080"/>
           </a:xfrm>
           <a:prstGeom prst="rect">
             <a:avLst/>
@@ -270,8 +268,8 @@
         </p:nvSpPr>
         <p:spPr>
           <a:xfrm>
-            <a:off x="4674240" y="1203480"/>
-            <a:ext cx="4015800" cy="1422720"/>
+            <a:off x="4674240" y="1203840"/>
+            <a:ext cx="4015800" cy="1423080"/>
           </a:xfrm>
           <a:prstGeom prst="rect">
             <a:avLst/>
@@ -306,8 +304,8 @@
         </p:nvSpPr>
         <p:spPr>
           <a:xfrm>
-            <a:off x="4674240" y="2761920"/>
-            <a:ext cx="4015800" cy="1422720"/>
+            <a:off x="4674240" y="2762640"/>
+            <a:ext cx="4015800" cy="1423080"/>
           </a:xfrm>
           <a:prstGeom prst="rect">
             <a:avLst/>
@@ -342,8 +340,8 @@
         </p:nvSpPr>
         <p:spPr>
           <a:xfrm>
-            <a:off x="457200" y="2761920"/>
-            <a:ext cx="4015800" cy="1422720"/>
+            <a:off x="457200" y="2762640"/>
+            <a:ext cx="4015800" cy="1423080"/>
           </a:xfrm>
           <a:prstGeom prst="rect">
             <a:avLst/>
@@ -401,7 +399,7 @@
         <p:spPr>
           <a:xfrm>
             <a:off x="98280" y="4680"/>
-            <a:ext cx="8825400" cy="625320"/>
+            <a:ext cx="8825040" cy="625320"/>
           </a:xfrm>
           <a:prstGeom prst="rect">
             <a:avLst/>
@@ -437,8 +435,8 @@
         </p:nvSpPr>
         <p:spPr>
           <a:xfrm>
-            <a:off x="457200" y="1203480"/>
-            <a:ext cx="8229240" cy="2983320"/>
+            <a:off x="457200" y="1203840"/>
+            <a:ext cx="8229240" cy="2983680"/>
           </a:xfrm>
           <a:prstGeom prst="rect">
             <a:avLst/>
@@ -473,8 +471,8 @@
         </p:nvSpPr>
         <p:spPr>
           <a:xfrm>
-            <a:off x="457200" y="1203480"/>
-            <a:ext cx="8229240" cy="2983320"/>
+            <a:off x="457200" y="1203840"/>
+            <a:ext cx="8229240" cy="2983680"/>
           </a:xfrm>
           <a:prstGeom prst="rect">
             <a:avLst/>
@@ -509,8 +507,8 @@
         </p:blipFill>
         <p:spPr>
           <a:xfrm>
-            <a:off x="2702160" y="1203120"/>
-            <a:ext cx="3738960" cy="2983320"/>
+            <a:off x="2701800" y="1203840"/>
+            <a:ext cx="3739320" cy="2983680"/>
           </a:xfrm>
           <a:prstGeom prst="rect">
             <a:avLst/>
@@ -532,8 +530,8 @@
         </p:blipFill>
         <p:spPr>
           <a:xfrm>
-            <a:off x="2702160" y="1203120"/>
-            <a:ext cx="3738960" cy="2983320"/>
+            <a:off x="2701800" y="1203840"/>
+            <a:ext cx="3739320" cy="2983680"/>
           </a:xfrm>
           <a:prstGeom prst="rect">
             <a:avLst/>
@@ -600,7 +598,7 @@
         <p:spPr>
           <a:xfrm>
             <a:off x="98280" y="4680"/>
-            <a:ext cx="8825400" cy="625320"/>
+            <a:ext cx="8825040" cy="625320"/>
           </a:xfrm>
           <a:prstGeom prst="rect">
             <a:avLst/>
@@ -636,8 +634,8 @@
         </p:nvSpPr>
         <p:spPr>
           <a:xfrm>
-            <a:off x="457200" y="1203480"/>
-            <a:ext cx="8229240" cy="2983320"/>
+            <a:off x="457200" y="1203840"/>
+            <a:ext cx="8229240" cy="2983680"/>
           </a:xfrm>
           <a:prstGeom prst="rect">
             <a:avLst/>
@@ -696,7 +694,7 @@
         <p:spPr>
           <a:xfrm>
             <a:off x="98280" y="4680"/>
-            <a:ext cx="8825400" cy="625320"/>
+            <a:ext cx="8825040" cy="625320"/>
           </a:xfrm>
           <a:prstGeom prst="rect">
             <a:avLst/>
@@ -732,8 +730,8 @@
         </p:nvSpPr>
         <p:spPr>
           <a:xfrm>
-            <a:off x="457200" y="1203480"/>
-            <a:ext cx="8229240" cy="2983320"/>
+            <a:off x="457200" y="1203840"/>
+            <a:ext cx="8229240" cy="2983680"/>
           </a:xfrm>
           <a:prstGeom prst="rect">
             <a:avLst/>
@@ -791,7 +789,7 @@
         <p:spPr>
           <a:xfrm>
             <a:off x="98280" y="4680"/>
-            <a:ext cx="8825400" cy="625320"/>
+            <a:ext cx="8825040" cy="625320"/>
           </a:xfrm>
           <a:prstGeom prst="rect">
             <a:avLst/>
@@ -827,8 +825,8 @@
         </p:nvSpPr>
         <p:spPr>
           <a:xfrm>
-            <a:off x="457200" y="1203480"/>
-            <a:ext cx="4015800" cy="2983320"/>
+            <a:off x="457200" y="1203840"/>
+            <a:ext cx="4015800" cy="2983680"/>
           </a:xfrm>
           <a:prstGeom prst="rect">
             <a:avLst/>
@@ -863,8 +861,8 @@
         </p:nvSpPr>
         <p:spPr>
           <a:xfrm>
-            <a:off x="4674240" y="1203480"/>
-            <a:ext cx="4015800" cy="2983320"/>
+            <a:off x="4674240" y="1203840"/>
+            <a:ext cx="4015800" cy="2983680"/>
           </a:xfrm>
           <a:prstGeom prst="rect">
             <a:avLst/>
@@ -922,7 +920,7 @@
         <p:spPr>
           <a:xfrm>
             <a:off x="98280" y="4680"/>
-            <a:ext cx="8825400" cy="625320"/>
+            <a:ext cx="8825040" cy="625320"/>
           </a:xfrm>
           <a:prstGeom prst="rect">
             <a:avLst/>
@@ -981,7 +979,7 @@
         <p:spPr>
           <a:xfrm>
             <a:off x="98280" y="4680"/>
-            <a:ext cx="8825400" cy="2898360"/>
+            <a:ext cx="8825040" cy="2898360"/>
           </a:xfrm>
           <a:prstGeom prst="rect">
             <a:avLst/>
@@ -1040,7 +1038,7 @@
         <p:spPr>
           <a:xfrm>
             <a:off x="98280" y="4680"/>
-            <a:ext cx="8825400" cy="625320"/>
+            <a:ext cx="8825040" cy="625320"/>
           </a:xfrm>
           <a:prstGeom prst="rect">
             <a:avLst/>
@@ -1076,8 +1074,8 @@
         </p:nvSpPr>
         <p:spPr>
           <a:xfrm>
-            <a:off x="457200" y="1203480"/>
-            <a:ext cx="4015800" cy="1422720"/>
+            <a:off x="457200" y="1203840"/>
+            <a:ext cx="4015800" cy="1423080"/>
           </a:xfrm>
           <a:prstGeom prst="rect">
             <a:avLst/>
@@ -1112,8 +1110,8 @@
         </p:nvSpPr>
         <p:spPr>
           <a:xfrm>
-            <a:off x="457200" y="2761920"/>
-            <a:ext cx="4015800" cy="1422720"/>
+            <a:off x="457200" y="2762640"/>
+            <a:ext cx="4015800" cy="1423080"/>
           </a:xfrm>
           <a:prstGeom prst="rect">
             <a:avLst/>
@@ -1148,8 +1146,8 @@
         </p:nvSpPr>
         <p:spPr>
           <a:xfrm>
-            <a:off x="4674240" y="1203480"/>
-            <a:ext cx="4015800" cy="2983320"/>
+            <a:off x="4674240" y="1203840"/>
+            <a:ext cx="4015800" cy="2983680"/>
           </a:xfrm>
           <a:prstGeom prst="rect">
             <a:avLst/>
@@ -1207,7 +1205,7 @@
         <p:spPr>
           <a:xfrm>
             <a:off x="98280" y="4680"/>
-            <a:ext cx="8825400" cy="625320"/>
+            <a:ext cx="8825040" cy="625320"/>
           </a:xfrm>
           <a:prstGeom prst="rect">
             <a:avLst/>
@@ -1243,8 +1241,8 @@
         </p:nvSpPr>
         <p:spPr>
           <a:xfrm>
-            <a:off x="457200" y="1203480"/>
-            <a:ext cx="8229240" cy="2983320"/>
+            <a:off x="457200" y="1203840"/>
+            <a:ext cx="8229240" cy="2983680"/>
           </a:xfrm>
           <a:prstGeom prst="rect">
             <a:avLst/>
@@ -1303,7 +1301,7 @@
         <p:spPr>
           <a:xfrm>
             <a:off x="98280" y="4680"/>
-            <a:ext cx="8825400" cy="625320"/>
+            <a:ext cx="8825040" cy="625320"/>
           </a:xfrm>
           <a:prstGeom prst="rect">
             <a:avLst/>
@@ -1339,8 +1337,8 @@
         </p:nvSpPr>
         <p:spPr>
           <a:xfrm>
-            <a:off x="457200" y="1203480"/>
-            <a:ext cx="4015800" cy="2983320"/>
+            <a:off x="457200" y="1203840"/>
+            <a:ext cx="4015800" cy="2983680"/>
           </a:xfrm>
           <a:prstGeom prst="rect">
             <a:avLst/>
@@ -1375,8 +1373,8 @@
         </p:nvSpPr>
         <p:spPr>
           <a:xfrm>
-            <a:off x="4674240" y="1203480"/>
-            <a:ext cx="4015800" cy="1422720"/>
+            <a:off x="4674240" y="1203840"/>
+            <a:ext cx="4015800" cy="1423080"/>
           </a:xfrm>
           <a:prstGeom prst="rect">
             <a:avLst/>
@@ -1411,8 +1409,8 @@
         </p:nvSpPr>
         <p:spPr>
           <a:xfrm>
-            <a:off x="4674240" y="2761920"/>
-            <a:ext cx="4015800" cy="1422720"/>
+            <a:off x="4674240" y="2762640"/>
+            <a:ext cx="4015800" cy="1423080"/>
           </a:xfrm>
           <a:prstGeom prst="rect">
             <a:avLst/>
@@ -1470,7 +1468,7 @@
         <p:spPr>
           <a:xfrm>
             <a:off x="98280" y="4680"/>
-            <a:ext cx="8825400" cy="625320"/>
+            <a:ext cx="8825040" cy="625320"/>
           </a:xfrm>
           <a:prstGeom prst="rect">
             <a:avLst/>
@@ -1506,8 +1504,8 @@
         </p:nvSpPr>
         <p:spPr>
           <a:xfrm>
-            <a:off x="457200" y="1203480"/>
-            <a:ext cx="4015800" cy="1422720"/>
+            <a:off x="457200" y="1203840"/>
+            <a:ext cx="4015800" cy="1423080"/>
           </a:xfrm>
           <a:prstGeom prst="rect">
             <a:avLst/>
@@ -1542,8 +1540,8 @@
         </p:nvSpPr>
         <p:spPr>
           <a:xfrm>
-            <a:off x="4674240" y="1203480"/>
-            <a:ext cx="4015800" cy="1422720"/>
+            <a:off x="4674240" y="1203840"/>
+            <a:ext cx="4015800" cy="1423080"/>
           </a:xfrm>
           <a:prstGeom prst="rect">
             <a:avLst/>
@@ -1578,8 +1576,8 @@
         </p:nvSpPr>
         <p:spPr>
           <a:xfrm>
-            <a:off x="457200" y="2761920"/>
-            <a:ext cx="8229240" cy="1422720"/>
+            <a:off x="457200" y="2762640"/>
+            <a:ext cx="8229240" cy="1423080"/>
           </a:xfrm>
           <a:prstGeom prst="rect">
             <a:avLst/>
@@ -1637,7 +1635,7 @@
         <p:spPr>
           <a:xfrm>
             <a:off x="98280" y="4680"/>
-            <a:ext cx="8825400" cy="625320"/>
+            <a:ext cx="8825040" cy="625320"/>
           </a:xfrm>
           <a:prstGeom prst="rect">
             <a:avLst/>
@@ -1673,8 +1671,8 @@
         </p:nvSpPr>
         <p:spPr>
           <a:xfrm>
-            <a:off x="457200" y="1203480"/>
-            <a:ext cx="8229240" cy="1422720"/>
+            <a:off x="457200" y="1203840"/>
+            <a:ext cx="8229240" cy="1423080"/>
           </a:xfrm>
           <a:prstGeom prst="rect">
             <a:avLst/>
@@ -1709,8 +1707,8 @@
         </p:nvSpPr>
         <p:spPr>
           <a:xfrm>
-            <a:off x="457200" y="2761920"/>
-            <a:ext cx="8229240" cy="1422720"/>
+            <a:off x="457200" y="2762640"/>
+            <a:ext cx="8229240" cy="1423080"/>
           </a:xfrm>
           <a:prstGeom prst="rect">
             <a:avLst/>
@@ -1768,7 +1766,7 @@
         <p:spPr>
           <a:xfrm>
             <a:off x="98280" y="4680"/>
-            <a:ext cx="8825400" cy="625320"/>
+            <a:ext cx="8825040" cy="625320"/>
           </a:xfrm>
           <a:prstGeom prst="rect">
             <a:avLst/>
@@ -1804,8 +1802,8 @@
         </p:nvSpPr>
         <p:spPr>
           <a:xfrm>
-            <a:off x="457200" y="1203480"/>
-            <a:ext cx="4015800" cy="1422720"/>
+            <a:off x="457200" y="1203840"/>
+            <a:ext cx="4015800" cy="1423080"/>
           </a:xfrm>
           <a:prstGeom prst="rect">
             <a:avLst/>
@@ -1840,8 +1838,8 @@
         </p:nvSpPr>
         <p:spPr>
           <a:xfrm>
-            <a:off x="4674240" y="1203480"/>
-            <a:ext cx="4015800" cy="1422720"/>
+            <a:off x="4674240" y="1203840"/>
+            <a:ext cx="4015800" cy="1423080"/>
           </a:xfrm>
           <a:prstGeom prst="rect">
             <a:avLst/>
@@ -1876,8 +1874,8 @@
         </p:nvSpPr>
         <p:spPr>
           <a:xfrm>
-            <a:off x="4674240" y="2761920"/>
-            <a:ext cx="4015800" cy="1422720"/>
+            <a:off x="4674240" y="2762640"/>
+            <a:ext cx="4015800" cy="1423080"/>
           </a:xfrm>
           <a:prstGeom prst="rect">
             <a:avLst/>
@@ -1912,8 +1910,8 @@
         </p:nvSpPr>
         <p:spPr>
           <a:xfrm>
-            <a:off x="457200" y="2761920"/>
-            <a:ext cx="4015800" cy="1422720"/>
+            <a:off x="457200" y="2762640"/>
+            <a:ext cx="4015800" cy="1423080"/>
           </a:xfrm>
           <a:prstGeom prst="rect">
             <a:avLst/>
@@ -1971,7 +1969,7 @@
         <p:spPr>
           <a:xfrm>
             <a:off x="98280" y="4680"/>
-            <a:ext cx="8825400" cy="625320"/>
+            <a:ext cx="8825040" cy="625320"/>
           </a:xfrm>
           <a:prstGeom prst="rect">
             <a:avLst/>
@@ -2007,8 +2005,8 @@
         </p:nvSpPr>
         <p:spPr>
           <a:xfrm>
-            <a:off x="457200" y="1203480"/>
-            <a:ext cx="8229240" cy="2983320"/>
+            <a:off x="457200" y="1203840"/>
+            <a:ext cx="8229240" cy="2983680"/>
           </a:xfrm>
           <a:prstGeom prst="rect">
             <a:avLst/>
@@ -2043,8 +2041,8 @@
         </p:nvSpPr>
         <p:spPr>
           <a:xfrm>
-            <a:off x="457200" y="1203480"/>
-            <a:ext cx="8229240" cy="2983320"/>
+            <a:off x="457200" y="1203840"/>
+            <a:ext cx="8229240" cy="2983680"/>
           </a:xfrm>
           <a:prstGeom prst="rect">
             <a:avLst/>
@@ -2079,8 +2077,8 @@
         </p:blipFill>
         <p:spPr>
           <a:xfrm>
-            <a:off x="2702160" y="1203120"/>
-            <a:ext cx="3738960" cy="2983320"/>
+            <a:off x="2701800" y="1203840"/>
+            <a:ext cx="3739320" cy="2983680"/>
           </a:xfrm>
           <a:prstGeom prst="rect">
             <a:avLst/>
@@ -2102,8 +2100,8 @@
         </p:blipFill>
         <p:spPr>
           <a:xfrm>
-            <a:off x="2702160" y="1203120"/>
-            <a:ext cx="3738960" cy="2983320"/>
+            <a:off x="2701800" y="1203840"/>
+            <a:ext cx="3739320" cy="2983680"/>
           </a:xfrm>
           <a:prstGeom prst="rect">
             <a:avLst/>
@@ -2148,7 +2146,7 @@
         <p:spPr>
           <a:xfrm>
             <a:off x="98280" y="4680"/>
-            <a:ext cx="8825400" cy="625320"/>
+            <a:ext cx="8825040" cy="625320"/>
           </a:xfrm>
           <a:prstGeom prst="rect">
             <a:avLst/>
@@ -2184,8 +2182,8 @@
         </p:nvSpPr>
         <p:spPr>
           <a:xfrm>
-            <a:off x="457200" y="1203480"/>
-            <a:ext cx="8229240" cy="2983320"/>
+            <a:off x="457200" y="1203840"/>
+            <a:ext cx="8229240" cy="2983680"/>
           </a:xfrm>
           <a:prstGeom prst="rect">
             <a:avLst/>
@@ -2243,7 +2241,7 @@
         <p:spPr>
           <a:xfrm>
             <a:off x="98280" y="4680"/>
-            <a:ext cx="8825400" cy="625320"/>
+            <a:ext cx="8825040" cy="625320"/>
           </a:xfrm>
           <a:prstGeom prst="rect">
             <a:avLst/>
@@ -2279,8 +2277,8 @@
         </p:nvSpPr>
         <p:spPr>
           <a:xfrm>
-            <a:off x="457200" y="1203480"/>
-            <a:ext cx="4015800" cy="2983320"/>
+            <a:off x="457200" y="1203840"/>
+            <a:ext cx="4015800" cy="2983680"/>
           </a:xfrm>
           <a:prstGeom prst="rect">
             <a:avLst/>
@@ -2315,8 +2313,8 @@
         </p:nvSpPr>
         <p:spPr>
           <a:xfrm>
-            <a:off x="4674240" y="1203480"/>
-            <a:ext cx="4015800" cy="2983320"/>
+            <a:off x="4674240" y="1203840"/>
+            <a:ext cx="4015800" cy="2983680"/>
           </a:xfrm>
           <a:prstGeom prst="rect">
             <a:avLst/>
@@ -2374,7 +2372,7 @@
         <p:spPr>
           <a:xfrm>
             <a:off x="98280" y="4680"/>
-            <a:ext cx="8825400" cy="625320"/>
+            <a:ext cx="8825040" cy="625320"/>
           </a:xfrm>
           <a:prstGeom prst="rect">
             <a:avLst/>
@@ -2433,7 +2431,7 @@
         <p:spPr>
           <a:xfrm>
             <a:off x="98280" y="4680"/>
-            <a:ext cx="8825400" cy="2898360"/>
+            <a:ext cx="8825040" cy="2898360"/>
           </a:xfrm>
           <a:prstGeom prst="rect">
             <a:avLst/>
@@ -2492,7 +2490,7 @@
         <p:spPr>
           <a:xfrm>
             <a:off x="98280" y="4680"/>
-            <a:ext cx="8825400" cy="625320"/>
+            <a:ext cx="8825040" cy="625320"/>
           </a:xfrm>
           <a:prstGeom prst="rect">
             <a:avLst/>
@@ -2528,8 +2526,8 @@
         </p:nvSpPr>
         <p:spPr>
           <a:xfrm>
-            <a:off x="457200" y="1203480"/>
-            <a:ext cx="4015800" cy="1422720"/>
+            <a:off x="457200" y="1203840"/>
+            <a:ext cx="4015800" cy="1423080"/>
           </a:xfrm>
           <a:prstGeom prst="rect">
             <a:avLst/>
@@ -2564,8 +2562,8 @@
         </p:nvSpPr>
         <p:spPr>
           <a:xfrm>
-            <a:off x="457200" y="2761920"/>
-            <a:ext cx="4015800" cy="1422720"/>
+            <a:off x="457200" y="2762640"/>
+            <a:ext cx="4015800" cy="1423080"/>
           </a:xfrm>
           <a:prstGeom prst="rect">
             <a:avLst/>
@@ -2600,8 +2598,8 @@
         </p:nvSpPr>
         <p:spPr>
           <a:xfrm>
-            <a:off x="4674240" y="1203480"/>
-            <a:ext cx="4015800" cy="2983320"/>
+            <a:off x="4674240" y="1203840"/>
+            <a:ext cx="4015800" cy="2983680"/>
           </a:xfrm>
           <a:prstGeom prst="rect">
             <a:avLst/>
@@ -2659,7 +2657,7 @@
         <p:spPr>
           <a:xfrm>
             <a:off x="98280" y="4680"/>
-            <a:ext cx="8825400" cy="625320"/>
+            <a:ext cx="8825040" cy="625320"/>
           </a:xfrm>
           <a:prstGeom prst="rect">
             <a:avLst/>
@@ -2695,8 +2693,8 @@
         </p:nvSpPr>
         <p:spPr>
           <a:xfrm>
-            <a:off x="457200" y="1203480"/>
-            <a:ext cx="4015800" cy="2983320"/>
+            <a:off x="457200" y="1203840"/>
+            <a:ext cx="4015800" cy="2983680"/>
           </a:xfrm>
           <a:prstGeom prst="rect">
             <a:avLst/>
@@ -2731,8 +2729,8 @@
         </p:nvSpPr>
         <p:spPr>
           <a:xfrm>
-            <a:off x="4674240" y="1203480"/>
-            <a:ext cx="4015800" cy="1422720"/>
+            <a:off x="4674240" y="1203840"/>
+            <a:ext cx="4015800" cy="1423080"/>
           </a:xfrm>
           <a:prstGeom prst="rect">
             <a:avLst/>
@@ -2767,8 +2765,8 @@
         </p:nvSpPr>
         <p:spPr>
           <a:xfrm>
-            <a:off x="4674240" y="2761920"/>
-            <a:ext cx="4015800" cy="1422720"/>
+            <a:off x="4674240" y="2762640"/>
+            <a:ext cx="4015800" cy="1423080"/>
           </a:xfrm>
           <a:prstGeom prst="rect">
             <a:avLst/>
@@ -2826,7 +2824,7 @@
         <p:spPr>
           <a:xfrm>
             <a:off x="98280" y="4680"/>
-            <a:ext cx="8825400" cy="625320"/>
+            <a:ext cx="8825040" cy="625320"/>
           </a:xfrm>
           <a:prstGeom prst="rect">
             <a:avLst/>
@@ -2862,8 +2860,8 @@
         </p:nvSpPr>
         <p:spPr>
           <a:xfrm>
-            <a:off x="457200" y="1203480"/>
-            <a:ext cx="4015800" cy="1422720"/>
+            <a:off x="457200" y="1203840"/>
+            <a:ext cx="4015800" cy="1423080"/>
           </a:xfrm>
           <a:prstGeom prst="rect">
             <a:avLst/>
@@ -2898,8 +2896,8 @@
         </p:nvSpPr>
         <p:spPr>
           <a:xfrm>
-            <a:off x="4674240" y="1203480"/>
-            <a:ext cx="4015800" cy="1422720"/>
+            <a:off x="4674240" y="1203840"/>
+            <a:ext cx="4015800" cy="1423080"/>
           </a:xfrm>
           <a:prstGeom prst="rect">
             <a:avLst/>
@@ -2934,8 +2932,8 @@
         </p:nvSpPr>
         <p:spPr>
           <a:xfrm>
-            <a:off x="457200" y="2761920"/>
-            <a:ext cx="8229240" cy="1422720"/>
+            <a:off x="457200" y="2762640"/>
+            <a:ext cx="8229240" cy="1423080"/>
           </a:xfrm>
           <a:prstGeom prst="rect">
             <a:avLst/>
@@ -3050,8 +3048,8 @@
         </p:nvSpPr>
         <p:spPr>
           <a:xfrm>
-            <a:off x="457200" y="1203480"/>
-            <a:ext cx="8229240" cy="2983320"/>
+            <a:off x="457200" y="1203840"/>
+            <a:ext cx="8229240" cy="2983680"/>
           </a:xfrm>
           <a:prstGeom prst="rect">
             <a:avLst/>
@@ -3358,8 +3356,8 @@
         </p:nvSpPr>
         <p:spPr>
           <a:xfrm flipH="1" rot="10800000">
-            <a:off x="27429480" y="14118480"/>
-            <a:ext cx="9142920" cy="4486680"/>
+            <a:off x="36572400" y="18605160"/>
+            <a:ext cx="9142560" cy="4486320"/>
           </a:xfrm>
           <a:prstGeom prst="rect">
             <a:avLst/>
@@ -3387,7 +3385,7 @@
         <p:spPr>
           <a:xfrm>
             <a:off x="0" y="656280"/>
-            <a:ext cx="9142920" cy="107640"/>
+            <a:ext cx="9142560" cy="107280"/>
           </a:xfrm>
           <a:prstGeom prst="rect">
             <a:avLst/>
@@ -3433,7 +3431,7 @@
         <p:spPr>
           <a:xfrm>
             <a:off x="98280" y="4680"/>
-            <a:ext cx="8825400" cy="624960"/>
+            <a:ext cx="8825040" cy="624960"/>
           </a:xfrm>
           <a:prstGeom prst="rect">
             <a:avLst/>
@@ -3469,8 +3467,8 @@
         </p:nvSpPr>
         <p:spPr>
           <a:xfrm>
-            <a:off x="457200" y="1203480"/>
-            <a:ext cx="8229240" cy="2983320"/>
+            <a:off x="457200" y="1203840"/>
+            <a:ext cx="8229240" cy="2983680"/>
           </a:xfrm>
           <a:prstGeom prst="rect">
             <a:avLst/>
@@ -3770,8 +3768,8 @@
         </p:nvSpPr>
         <p:spPr>
           <a:xfrm>
-            <a:off x="460800" y="460800"/>
-            <a:ext cx="8220960" cy="3706200"/>
+            <a:off x="98280" y="16200"/>
+            <a:ext cx="8825040" cy="601200"/>
           </a:xfrm>
           <a:prstGeom prst="rect">
             <a:avLst/>
@@ -3787,510 +3785,17 @@
           <a:effectRef idx="0"/>
           <a:fontRef idx="minor"/>
         </p:style>
-        <p:txBody>
-          <a:bodyPr lIns="90000" rIns="90000" tIns="91440" bIns="91440" anchor="ctr"/>
-          <a:p>
-            <a:r>
-              <a:rPr b="0" lang="en-GB" sz="3600" spc="-1" strike="noStrike">
-                <a:solidFill>
-                  <a:srgbClr val="ffffff"/>
-                </a:solidFill>
-                <a:uFill>
-                  <a:solidFill>
-                    <a:srgbClr val="ffffff"/>
-                  </a:solidFill>
-                </a:uFill>
-                <a:latin typeface="Roboto"/>
-                <a:ea typeface="Roboto"/>
-              </a:rPr>
-              <a:t>2. Maximise Profit</a:t>
-            </a:r>
-            <a:endParaRPr b="0" lang="en-GB" sz="1800" spc="-1" strike="noStrike">
-              <a:solidFill>
-                <a:srgbClr val="000000"/>
-              </a:solidFill>
-              <a:uFill>
-                <a:solidFill>
-                  <a:srgbClr val="ffffff"/>
-                </a:solidFill>
-              </a:uFill>
-              <a:latin typeface="Arial"/>
-            </a:endParaRPr>
-          </a:p>
-          <a:p>
-            <a:endParaRPr b="0" lang="en-GB" sz="1800" spc="-1" strike="noStrike">
-              <a:solidFill>
-                <a:srgbClr val="000000"/>
-              </a:solidFill>
-              <a:uFill>
-                <a:solidFill>
-                  <a:srgbClr val="ffffff"/>
-                </a:solidFill>
-              </a:uFill>
-              <a:latin typeface="Arial"/>
-            </a:endParaRPr>
-          </a:p>
-          <a:p>
-            <a:r>
-              <a:rPr b="0" lang="en-GB" sz="1800" spc="-1" strike="noStrike">
-                <a:solidFill>
-                  <a:srgbClr val="ffffff"/>
-                </a:solidFill>
-                <a:uFill>
-                  <a:solidFill>
-                    <a:srgbClr val="ffffff"/>
-                  </a:solidFill>
-                </a:uFill>
-                <a:latin typeface="Roboto"/>
-                <a:ea typeface="Roboto"/>
-              </a:rPr>
-              <a:t>Assuming the product has an expected payoff 1% of the current balance, and the cost of performing a call is €1, which customers would you contact and what would be the expected payoff with your strategy, assuming the bank has 10 million customers drawn from the same distribution as the training set?</a:t>
-            </a:r>
-            <a:endParaRPr b="0" lang="en-GB" sz="1800" spc="-1" strike="noStrike">
-              <a:solidFill>
-                <a:srgbClr val="000000"/>
-              </a:solidFill>
-              <a:uFill>
-                <a:solidFill>
-                  <a:srgbClr val="ffffff"/>
-                </a:solidFill>
-              </a:uFill>
-              <a:latin typeface="Arial"/>
-            </a:endParaRPr>
-          </a:p>
-          <a:p>
-            <a:endParaRPr b="0" lang="en-GB" sz="1800" spc="-1" strike="noStrike">
-              <a:solidFill>
-                <a:srgbClr val="000000"/>
-              </a:solidFill>
-              <a:uFill>
-                <a:solidFill>
-                  <a:srgbClr val="ffffff"/>
-                </a:solidFill>
-              </a:uFill>
-              <a:latin typeface="Arial"/>
-            </a:endParaRPr>
-          </a:p>
-          <a:p>
-            <a:pPr>
-              <a:lnSpc>
-                <a:spcPct val="100000"/>
-              </a:lnSpc>
-            </a:pPr>
-            <a:endParaRPr b="0" lang="en-GB" sz="1800" spc="-1" strike="noStrike">
-              <a:solidFill>
-                <a:srgbClr val="000000"/>
-              </a:solidFill>
-              <a:uFill>
-                <a:solidFill>
-                  <a:srgbClr val="ffffff"/>
-                </a:solidFill>
-              </a:uFill>
-              <a:latin typeface="Arial"/>
-            </a:endParaRPr>
-          </a:p>
-        </p:txBody>
-      </p:sp>
-    </p:spTree>
-  </p:cSld>
-  <p:timing>
-    <p:tnLst>
-      <p:par>
-        <p:cTn id="1" dur="indefinite" restart="never" nodeType="tmRoot">
-          <p:childTnLst>
-            <p:seq>
-              <p:cTn id="2" nodeType="mainSeq"/>
-              <p:prevCondLst>
-                <p:cond delay="0" evt="onPrev">
-                  <p:tgtEl>
-                    <p:sldTgt/>
-                  </p:tgtEl>
-                </p:cond>
-              </p:prevCondLst>
-              <p:nextCondLst>
-                <p:cond delay="0" evt="onNext">
-                  <p:tgtEl>
-                    <p:sldTgt/>
-                  </p:tgtEl>
-                </p:cond>
-              </p:nextCondLst>
-            </p:seq>
-          </p:childTnLst>
-        </p:cTn>
-      </p:par>
-    </p:tnLst>
-  </p:timing>
-</p:sld>
-</file>
-
-<file path=ppt/slides/slide2.xml><?xml version="1.0" encoding="utf-8"?>
-<p:sld xmlns:a="http://schemas.openxmlformats.org/drawingml/2006/main" xmlns:p="http://schemas.openxmlformats.org/presentationml/2006/main" xmlns:r="http://schemas.openxmlformats.org/officeDocument/2006/relationships" xmlns:p14="http://schemas.microsoft.com/office/powerpoint/2010/main" xmlns:p15="http://schemas.microsoft.com/office/powerpoint/2012/main" xmlns:mc="http://schemas.openxmlformats.org/markup-compatibility/2006">
-  <p:cSld>
-    <p:spTree>
-      <p:nvGrpSpPr>
-        <p:cNvPr id="1" name=""/>
-        <p:cNvGrpSpPr/>
-        <p:nvPr/>
-      </p:nvGrpSpPr>
-      <p:grpSpPr>
-        <a:xfrm>
-          <a:off x="0" y="0"/>
-          <a:ext cx="0" cy="0"/>
-          <a:chOff x="0" y="0"/>
-          <a:chExt cx="0" cy="0"/>
-        </a:xfrm>
-      </p:grpSpPr>
-      <p:sp>
-        <p:nvSpPr>
-          <p:cNvPr id="75" name="CustomShape 1"/>
+      </p:sp>
+      <p:sp>
+        <p:nvSpPr>
+          <p:cNvPr id="75" name="CustomShape 2"/>
           <p:cNvSpPr/>
           <p:nvPr/>
         </p:nvSpPr>
         <p:spPr>
           <a:xfrm>
-            <a:off x="98280" y="16200"/>
-            <a:ext cx="8825400" cy="601560"/>
-          </a:xfrm>
-          <a:prstGeom prst="rect">
-            <a:avLst/>
-          </a:prstGeom>
-          <a:noFill/>
-          <a:ln>
-            <a:noFill/>
-          </a:ln>
-        </p:spPr>
-        <p:style>
-          <a:lnRef idx="0"/>
-          <a:fillRef idx="0"/>
-          <a:effectRef idx="0"/>
-          <a:fontRef idx="minor"/>
-        </p:style>
-        <p:txBody>
-          <a:bodyPr lIns="90000" rIns="90000" tIns="91440" bIns="91440" anchor="ctr"/>
-          <a:p>
-            <a:pPr>
-              <a:lnSpc>
-                <a:spcPct val="100000"/>
-              </a:lnSpc>
-            </a:pPr>
-            <a:r>
-              <a:rPr b="0" lang="en-GB" sz="1800" spc="-1" strike="noStrike">
-                <a:solidFill>
-                  <a:srgbClr val="ffffff"/>
-                </a:solidFill>
-                <a:uFill>
-                  <a:solidFill>
-                    <a:srgbClr val="ffffff"/>
-                  </a:solidFill>
-                </a:uFill>
-                <a:latin typeface="Roboto"/>
-                <a:ea typeface="Roboto"/>
-              </a:rPr>
-              <a:t>Metric for Optimization: Net Profit</a:t>
-            </a:r>
-            <a:endParaRPr b="0" lang="en-GB" sz="1800" spc="-1" strike="noStrike">
-              <a:solidFill>
-                <a:srgbClr val="000000"/>
-              </a:solidFill>
-              <a:uFill>
-                <a:solidFill>
-                  <a:srgbClr val="ffffff"/>
-                </a:solidFill>
-              </a:uFill>
-              <a:latin typeface="Arial"/>
-            </a:endParaRPr>
-          </a:p>
-        </p:txBody>
-      </p:sp>
-      <p:sp>
-        <p:nvSpPr>
-          <p:cNvPr id="76" name="CustomShape 2"/>
-          <p:cNvSpPr/>
-          <p:nvPr/>
-        </p:nvSpPr>
-        <p:spPr>
-          <a:xfrm>
-            <a:off x="394920" y="811800"/>
-            <a:ext cx="8141760" cy="3399120"/>
-          </a:xfrm>
-          <a:prstGeom prst="rect">
-            <a:avLst/>
-          </a:prstGeom>
-          <a:noFill/>
-          <a:ln>
-            <a:noFill/>
-          </a:ln>
-        </p:spPr>
-        <p:style>
-          <a:lnRef idx="0"/>
-          <a:fillRef idx="0"/>
-          <a:effectRef idx="0"/>
-          <a:fontRef idx="minor"/>
-        </p:style>
-        <p:txBody>
-          <a:bodyPr lIns="90000" rIns="90000" tIns="91440" bIns="91440"/>
-          <a:p>
-            <a:pPr marL="457200" indent="-329040">
-              <a:lnSpc>
-                <a:spcPct val="115000"/>
-              </a:lnSpc>
-              <a:buClr>
-                <a:srgbClr val="737373"/>
-              </a:buClr>
-              <a:buFont typeface="Roboto"/>
-              <a:buChar char="●"/>
-            </a:pPr>
-            <a:r>
-              <a:rPr b="0" lang="en-GB" sz="1600" spc="-1" strike="noStrike">
-                <a:solidFill>
-                  <a:srgbClr val="737373"/>
-                </a:solidFill>
-                <a:uFill>
-                  <a:solidFill>
-                    <a:srgbClr val="ffffff"/>
-                  </a:solidFill>
-                </a:uFill>
-                <a:latin typeface="Roboto"/>
-                <a:ea typeface="Roboto"/>
-              </a:rPr>
-              <a:t>Given the defined payoff per customer and calling cost, the objective is to maximize the sum of the net profit over all contacted customers</a:t>
-            </a:r>
-            <a:endParaRPr b="0" lang="en-GB" sz="1800" spc="-1" strike="noStrike">
-              <a:solidFill>
-                <a:srgbClr val="000000"/>
-              </a:solidFill>
-              <a:uFill>
-                <a:solidFill>
-                  <a:srgbClr val="ffffff"/>
-                </a:solidFill>
-              </a:uFill>
-              <a:latin typeface="Arial"/>
-            </a:endParaRPr>
-          </a:p>
-          <a:p>
-            <a:pPr marL="457200" indent="-329040">
-              <a:lnSpc>
-                <a:spcPct val="115000"/>
-              </a:lnSpc>
-              <a:buClr>
-                <a:srgbClr val="737373"/>
-              </a:buClr>
-              <a:buFont typeface="Roboto"/>
-              <a:buChar char="●"/>
-            </a:pPr>
-            <a:r>
-              <a:rPr b="0" lang="en-GB" sz="1600" spc="-1" strike="noStrike">
-                <a:solidFill>
-                  <a:srgbClr val="737373"/>
-                </a:solidFill>
-                <a:uFill>
-                  <a:solidFill>
-                    <a:srgbClr val="ffffff"/>
-                  </a:solidFill>
-                </a:uFill>
-                <a:latin typeface="Roboto"/>
-                <a:ea typeface="Roboto"/>
-              </a:rPr>
-              <a:t>Net profit is equal to </a:t>
-            </a:r>
-            <a:endParaRPr b="0" lang="en-GB" sz="1800" spc="-1" strike="noStrike">
-              <a:solidFill>
-                <a:srgbClr val="000000"/>
-              </a:solidFill>
-              <a:uFill>
-                <a:solidFill>
-                  <a:srgbClr val="ffffff"/>
-                </a:solidFill>
-              </a:uFill>
-              <a:latin typeface="Arial"/>
-            </a:endParaRPr>
-          </a:p>
-          <a:p>
-            <a:pPr marL="457200" indent="-329040">
-              <a:lnSpc>
-                <a:spcPct val="115000"/>
-              </a:lnSpc>
-              <a:buClr>
-                <a:srgbClr val="737373"/>
-              </a:buClr>
-              <a:buFont typeface="Roboto"/>
-              <a:buChar char="●"/>
-            </a:pPr>
-            <a:r>
-              <a:rPr b="0" lang="en-GB" sz="1600" spc="-1" strike="noStrike">
-                <a:solidFill>
-                  <a:srgbClr val="737373"/>
-                </a:solidFill>
-                <a:uFill>
-                  <a:solidFill>
-                    <a:srgbClr val="ffffff"/>
-                  </a:solidFill>
-                </a:uFill>
-                <a:latin typeface="Roboto"/>
-                <a:ea typeface="Roboto"/>
-              </a:rPr>
-              <a:t>Need to account for the fact that misclassification cost is asymmetric, i.e. false positives are ‘cheaper’ than false negatives, since in general the expected payoff will be greater than the call charge.</a:t>
-            </a:r>
-            <a:endParaRPr b="0" lang="en-GB" sz="1800" spc="-1" strike="noStrike">
-              <a:solidFill>
-                <a:srgbClr val="000000"/>
-              </a:solidFill>
-              <a:uFill>
-                <a:solidFill>
-                  <a:srgbClr val="ffffff"/>
-                </a:solidFill>
-              </a:uFill>
-              <a:latin typeface="Arial"/>
-            </a:endParaRPr>
-          </a:p>
-          <a:p>
-            <a:pPr marL="457200" indent="-329040">
-              <a:lnSpc>
-                <a:spcPct val="115000"/>
-              </a:lnSpc>
-              <a:buClr>
-                <a:srgbClr val="737373"/>
-              </a:buClr>
-              <a:buFont typeface="Roboto"/>
-              <a:buChar char="●"/>
-            </a:pPr>
-            <a:r>
-              <a:rPr b="0" lang="en-GB" sz="1600" spc="-1" strike="noStrike">
-                <a:solidFill>
-                  <a:srgbClr val="737373"/>
-                </a:solidFill>
-                <a:uFill>
-                  <a:solidFill>
-                    <a:srgbClr val="ffffff"/>
-                  </a:solidFill>
-                </a:uFill>
-                <a:latin typeface="Roboto"/>
-                <a:ea typeface="Roboto"/>
-              </a:rPr>
-              <a:t>One possible strategy is to modify the decision function of the classifiers so that we reduce the number of false negatives at the expense of increasing the number of false positives. </a:t>
-            </a:r>
-            <a:endParaRPr b="0" lang="en-GB" sz="1800" spc="-1" strike="noStrike">
-              <a:solidFill>
-                <a:srgbClr val="000000"/>
-              </a:solidFill>
-              <a:uFill>
-                <a:solidFill>
-                  <a:srgbClr val="ffffff"/>
-                </a:solidFill>
-              </a:uFill>
-              <a:latin typeface="Arial"/>
-            </a:endParaRPr>
-          </a:p>
-        </p:txBody>
-      </p:sp>
-      <p:pic>
-        <p:nvPicPr>
-          <p:cNvPr id="77" name="Shape 152" descr=""/>
-          <p:cNvPicPr/>
-          <p:nvPr/>
-        </p:nvPicPr>
-        <p:blipFill>
-          <a:blip r:embed="rId1"/>
-          <a:stretch/>
-        </p:blipFill>
-        <p:spPr>
-          <a:xfrm>
-            <a:off x="2907000" y="1458720"/>
-            <a:ext cx="3427200" cy="514440"/>
-          </a:xfrm>
-          <a:prstGeom prst="rect">
-            <a:avLst/>
-          </a:prstGeom>
-          <a:ln>
-            <a:noFill/>
-          </a:ln>
-        </p:spPr>
-      </p:pic>
-    </p:spTree>
-  </p:cSld>
-  <p:timing>
-    <p:tnLst>
-      <p:par>
-        <p:cTn id="3" dur="indefinite" restart="never" nodeType="tmRoot">
-          <p:childTnLst>
-            <p:seq>
-              <p:cTn id="4" nodeType="mainSeq"/>
-              <p:prevCondLst>
-                <p:cond delay="0" evt="onPrev">
-                  <p:tgtEl>
-                    <p:sldTgt/>
-                  </p:tgtEl>
-                </p:cond>
-              </p:prevCondLst>
-              <p:nextCondLst>
-                <p:cond delay="0" evt="onNext">
-                  <p:tgtEl>
-                    <p:sldTgt/>
-                  </p:tgtEl>
-                </p:cond>
-              </p:nextCondLst>
-            </p:seq>
-          </p:childTnLst>
-        </p:cTn>
-      </p:par>
-    </p:tnLst>
-  </p:timing>
-</p:sld>
-</file>
-
-<file path=ppt/slides/slide3.xml><?xml version="1.0" encoding="utf-8"?>
-<p:sld xmlns:a="http://schemas.openxmlformats.org/drawingml/2006/main" xmlns:p="http://schemas.openxmlformats.org/presentationml/2006/main" xmlns:r="http://schemas.openxmlformats.org/officeDocument/2006/relationships" xmlns:p14="http://schemas.microsoft.com/office/powerpoint/2010/main" xmlns:p15="http://schemas.microsoft.com/office/powerpoint/2012/main" xmlns:mc="http://schemas.openxmlformats.org/markup-compatibility/2006">
-  <p:cSld>
-    <p:spTree>
-      <p:nvGrpSpPr>
-        <p:cNvPr id="1" name=""/>
-        <p:cNvGrpSpPr/>
-        <p:nvPr/>
-      </p:nvGrpSpPr>
-      <p:grpSpPr>
-        <a:xfrm>
-          <a:off x="0" y="0"/>
-          <a:ext cx="0" cy="0"/>
-          <a:chOff x="0" y="0"/>
-          <a:chExt cx="0" cy="0"/>
-        </a:xfrm>
-      </p:grpSpPr>
-      <p:sp>
-        <p:nvSpPr>
-          <p:cNvPr id="78" name="CustomShape 1"/>
-          <p:cNvSpPr/>
-          <p:nvPr/>
-        </p:nvSpPr>
-        <p:spPr>
-          <a:xfrm>
-            <a:off x="98280" y="16200"/>
-            <a:ext cx="8825400" cy="601560"/>
-          </a:xfrm>
-          <a:prstGeom prst="rect">
-            <a:avLst/>
-          </a:prstGeom>
-          <a:noFill/>
-          <a:ln>
-            <a:noFill/>
-          </a:ln>
-        </p:spPr>
-        <p:style>
-          <a:lnRef idx="0"/>
-          <a:fillRef idx="0"/>
-          <a:effectRef idx="0"/>
-          <a:fontRef idx="minor"/>
-        </p:style>
-      </p:sp>
-      <p:sp>
-        <p:nvSpPr>
-          <p:cNvPr id="79" name="CustomShape 2"/>
-          <p:cNvSpPr/>
-          <p:nvPr/>
-        </p:nvSpPr>
-        <p:spPr>
-          <a:xfrm>
             <a:off x="134640" y="16560"/>
-            <a:ext cx="8825400" cy="601560"/>
+            <a:ext cx="8825040" cy="601200"/>
           </a:xfrm>
           <a:prstGeom prst="rect">
             <a:avLst/>
@@ -4329,30 +3834,30 @@
               </a:rPr>
               <a:t>Threshold Method</a:t>
             </a:r>
-            <a:endParaRPr b="0" lang="en-GB" sz="2000" spc="-1" strike="noStrike">
-              <a:solidFill>
-                <a:srgbClr val="000000"/>
-              </a:solidFill>
-              <a:uFill>
-                <a:solidFill>
-                  <a:srgbClr val="ffffff"/>
-                </a:solidFill>
-              </a:uFill>
-              <a:latin typeface="Roboto"/>
-            </a:endParaRPr>
-          </a:p>
-        </p:txBody>
-      </p:sp>
-      <p:sp>
-        <p:nvSpPr>
-          <p:cNvPr id="80" name="CustomShape 3"/>
+            <a:endParaRPr b="0" lang="en-GB" sz="1800" spc="-1" strike="noStrike">
+              <a:solidFill>
+                <a:srgbClr val="000000"/>
+              </a:solidFill>
+              <a:uFill>
+                <a:solidFill>
+                  <a:srgbClr val="ffffff"/>
+                </a:solidFill>
+              </a:uFill>
+              <a:latin typeface="Arial"/>
+            </a:endParaRPr>
+          </a:p>
+        </p:txBody>
+      </p:sp>
+      <p:sp>
+        <p:nvSpPr>
+          <p:cNvPr id="76" name="CustomShape 3"/>
           <p:cNvSpPr/>
           <p:nvPr/>
         </p:nvSpPr>
         <p:spPr>
           <a:xfrm>
             <a:off x="3960000" y="864000"/>
-            <a:ext cx="4824000" cy="3396240"/>
+            <a:ext cx="4823640" cy="3395880"/>
           </a:xfrm>
           <a:prstGeom prst="rect">
             <a:avLst/>
@@ -4371,7 +3876,7 @@
         <p:txBody>
           <a:bodyPr lIns="90000" rIns="90000" tIns="45000" bIns="45000"/>
           <a:p>
-            <a:pPr marL="457200" indent="-329040">
+            <a:pPr marL="457200" indent="-328680">
               <a:lnSpc>
                 <a:spcPct val="100000"/>
               </a:lnSpc>
@@ -4409,7 +3914,7 @@
             </a:endParaRPr>
           </a:p>
           <a:p>
-            <a:pPr marL="457200" indent="-329040">
+            <a:pPr marL="457200" indent="-328680">
               <a:lnSpc>
                 <a:spcPct val="100000"/>
               </a:lnSpc>
@@ -4447,7 +3952,7 @@
             </a:endParaRPr>
           </a:p>
           <a:p>
-            <a:pPr marL="457200" indent="-329040">
+            <a:pPr marL="457200" indent="-328680">
               <a:lnSpc>
                 <a:spcPct val="100000"/>
               </a:lnSpc>
@@ -4485,7 +3990,7 @@
             </a:endParaRPr>
           </a:p>
           <a:p>
-            <a:pPr marL="457200" indent="-329040">
+            <a:pPr marL="457200" indent="-328680">
               <a:lnSpc>
                 <a:spcPct val="100000"/>
               </a:lnSpc>
@@ -4523,7 +4028,7 @@
             </a:endParaRPr>
           </a:p>
           <a:p>
-            <a:pPr marL="457200" indent="-329040">
+            <a:pPr marL="457200" indent="-328680">
               <a:lnSpc>
                 <a:spcPct val="100000"/>
               </a:lnSpc>
@@ -4561,7 +4066,7 @@
             </a:endParaRPr>
           </a:p>
           <a:p>
-            <a:pPr marL="457200" indent="-329040">
+            <a:pPr marL="457200" indent="-328680">
               <a:lnSpc>
                 <a:spcPct val="100000"/>
               </a:lnSpc>
@@ -4599,7 +4104,7 @@
             </a:endParaRPr>
           </a:p>
           <a:p>
-            <a:pPr marL="457200" indent="-329040">
+            <a:pPr marL="457200" indent="-328680">
               <a:lnSpc>
                 <a:spcPct val="100000"/>
               </a:lnSpc>
@@ -4640,14 +4145,14 @@
       </p:sp>
       <p:sp>
         <p:nvSpPr>
-          <p:cNvPr id="81" name="CustomShape 4"/>
+          <p:cNvPr id="77" name="CustomShape 4"/>
           <p:cNvSpPr/>
           <p:nvPr/>
         </p:nvSpPr>
         <p:spPr>
           <a:xfrm>
             <a:off x="360000" y="4320360"/>
-            <a:ext cx="7991280" cy="561960"/>
+            <a:ext cx="7990920" cy="561600"/>
           </a:xfrm>
           <a:prstGeom prst="rect">
             <a:avLst/>
@@ -4702,7 +4207,7 @@
       </p:sp>
       <p:pic>
         <p:nvPicPr>
-          <p:cNvPr id="82" name="" descr=""/>
+          <p:cNvPr id="78" name="" descr=""/>
           <p:cNvPicPr/>
           <p:nvPr/>
         </p:nvPicPr>
@@ -4713,7 +4218,7 @@
         <p:spPr>
           <a:xfrm>
             <a:off x="233280" y="1311840"/>
-            <a:ext cx="3870720" cy="2360160"/>
+            <a:ext cx="3870360" cy="2359800"/>
           </a:xfrm>
           <a:prstGeom prst="rect">
             <a:avLst/>
@@ -4728,10 +4233,10 @@
   <p:timing>
     <p:tnLst>
       <p:par>
-        <p:cTn id="5" dur="indefinite" restart="never" nodeType="tmRoot">
+        <p:cTn id="1" dur="indefinite" restart="never" nodeType="tmRoot">
           <p:childTnLst>
             <p:seq>
-              <p:cTn id="6" nodeType="mainSeq"/>
+              <p:cTn id="2" nodeType="mainSeq"/>
               <p:prevCondLst>
                 <p:cond delay="0" evt="onPrev">
                   <p:tgtEl>

</xml_diff>